<commit_message>
LOCAL + Mise ajour
</commit_message>
<xml_diff>
--- a/Documentation/TODO.pptx
+++ b/Documentation/TODO.pptx
@@ -3128,7 +3128,7 @@
           <a:p>
             <a:fld id="{300E0152-FD71-476E-93B4-2748553546FC}" type="datetimeFigureOut">
               <a:rPr lang="fr-FR" smtClean="0"/>
-              <a:t>08/04/2022</a:t>
+              <a:t>11/04/2022</a:t>
             </a:fld>
             <a:endParaRPr lang="fr-FR"/>
           </a:p>
@@ -3306,7 +3306,7 @@
           <a:p>
             <a:fld id="{7E818C28-E326-4E30-9CF2-2C1A4C894E1E}" type="datetimeFigureOut">
               <a:rPr lang="fr-FR" noProof="0" smtClean="0"/>
-              <a:t>08/04/2022</a:t>
+              <a:t>11/04/2022</a:t>
             </a:fld>
             <a:endParaRPr lang="fr-FR" noProof="0"/>
           </a:p>
@@ -4351,7 +4351,7 @@
             <a:pPr rtl="0"/>
             <a:fld id="{84D57ED5-9CB3-4471-9B6F-968F3C8F84E1}" type="datetime1">
               <a:rPr lang="fr-FR" noProof="0" smtClean="0"/>
-              <a:t>08/04/2022</a:t>
+              <a:t>11/04/2022</a:t>
             </a:fld>
             <a:endParaRPr lang="fr-FR" noProof="0"/>
           </a:p>
@@ -4693,7 +4693,7 @@
             <a:pPr rtl="0"/>
             <a:fld id="{82C21BD6-09AD-4CE8-91E4-0CCB39C35B1C}" type="datetime1">
               <a:rPr lang="fr-FR" noProof="0" smtClean="0"/>
-              <a:t>08/04/2022</a:t>
+              <a:t>11/04/2022</a:t>
             </a:fld>
             <a:endParaRPr lang="fr-FR" noProof="0"/>
           </a:p>
@@ -5098,7 +5098,7 @@
             <a:pPr rtl="0"/>
             <a:fld id="{3C77B77F-91DD-4C26-904A-477D7569DB10}" type="datetime1">
               <a:rPr lang="fr-FR" noProof="0" smtClean="0"/>
-              <a:t>08/04/2022</a:t>
+              <a:t>11/04/2022</a:t>
             </a:fld>
             <a:endParaRPr lang="fr-FR" noProof="0"/>
           </a:p>
@@ -5438,7 +5438,7 @@
             <a:pPr rtl="0"/>
             <a:fld id="{BF2D40E6-123C-44C7-96E6-E5EB17E95AC5}" type="datetime1">
               <a:rPr lang="fr-FR" noProof="0" smtClean="0"/>
-              <a:t>08/04/2022</a:t>
+              <a:t>11/04/2022</a:t>
             </a:fld>
             <a:endParaRPr lang="fr-FR" noProof="0"/>
           </a:p>
@@ -5763,7 +5763,7 @@
             <a:pPr rtl="0"/>
             <a:fld id="{BF2D40E6-123C-44C7-96E6-E5EB17E95AC5}" type="datetime1">
               <a:rPr lang="fr-FR" noProof="0" smtClean="0"/>
-              <a:t>08/04/2022</a:t>
+              <a:t>11/04/2022</a:t>
             </a:fld>
             <a:endParaRPr lang="fr-FR" noProof="0"/>
           </a:p>
@@ -6164,7 +6164,7 @@
             <a:pPr rtl="0"/>
             <a:fld id="{5E9C6408-3BC8-40DF-BC19-0E01079E3CE3}" type="datetime1">
               <a:rPr lang="fr-FR" noProof="0" smtClean="0"/>
-              <a:t>08/04/2022</a:t>
+              <a:t>11/04/2022</a:t>
             </a:fld>
             <a:endParaRPr lang="fr-FR" noProof="0"/>
           </a:p>
@@ -6425,7 +6425,7 @@
             <a:pPr rtl="0"/>
             <a:fld id="{475489E5-EE2A-4D3B-B34D-823A7028B4FB}" type="datetime1">
               <a:rPr lang="fr-FR" noProof="0" smtClean="0"/>
-              <a:t>08/04/2022</a:t>
+              <a:t>11/04/2022</a:t>
             </a:fld>
             <a:endParaRPr lang="fr-FR" noProof="0"/>
           </a:p>
@@ -6691,7 +6691,7 @@
             <a:pPr rtl="0"/>
             <a:fld id="{CD123ACB-C9EE-4C9E-B8CE-AAAC5E9A0232}" type="datetime1">
               <a:rPr lang="fr-FR" noProof="0" smtClean="0"/>
-              <a:t>08/04/2022</a:t>
+              <a:t>11/04/2022</a:t>
             </a:fld>
             <a:endParaRPr lang="fr-FR" noProof="0"/>
           </a:p>
@@ -6957,7 +6957,7 @@
             <a:pPr rtl="0"/>
             <a:fld id="{6860E4D8-56D9-4E46-AB44-CADDEB05CB81}" type="datetime1">
               <a:rPr lang="fr-FR" noProof="0" smtClean="0"/>
-              <a:t>08/04/2022</a:t>
+              <a:t>11/04/2022</a:t>
             </a:fld>
             <a:endParaRPr lang="fr-FR" noProof="0"/>
           </a:p>
@@ -7290,7 +7290,7 @@
             <a:pPr rtl="0"/>
             <a:fld id="{BF2D40E6-123C-44C7-96E6-E5EB17E95AC5}" type="datetime1">
               <a:rPr lang="fr-FR" noProof="0" smtClean="0"/>
-              <a:t>08/04/2022</a:t>
+              <a:t>11/04/2022</a:t>
             </a:fld>
             <a:endParaRPr lang="fr-FR" noProof="0"/>
           </a:p>
@@ -7618,7 +7618,7 @@
             <a:pPr rtl="0"/>
             <a:fld id="{5ADDB20C-1774-4B16-9666-0BE66B3E81AC}" type="datetime1">
               <a:rPr lang="fr-FR" noProof="0" smtClean="0"/>
-              <a:t>08/04/2022</a:t>
+              <a:t>11/04/2022</a:t>
             </a:fld>
             <a:endParaRPr lang="fr-FR" noProof="0"/>
           </a:p>
@@ -8079,7 +8079,7 @@
             <a:pPr rtl="0"/>
             <a:fld id="{1F37DF42-8FE2-4196-B087-A644399BE082}" type="datetime1">
               <a:rPr lang="fr-FR" noProof="0" smtClean="0"/>
-              <a:t>08/04/2022</a:t>
+              <a:t>11/04/2022</a:t>
             </a:fld>
             <a:endParaRPr lang="fr-FR" noProof="0"/>
           </a:p>
@@ -8288,7 +8288,7 @@
             <a:pPr rtl="0"/>
             <a:fld id="{BF2D40E6-123C-44C7-96E6-E5EB17E95AC5}" type="datetime1">
               <a:rPr lang="fr-FR" noProof="0" smtClean="0"/>
-              <a:t>08/04/2022</a:t>
+              <a:t>11/04/2022</a:t>
             </a:fld>
             <a:endParaRPr lang="fr-FR" noProof="0"/>
           </a:p>
@@ -8470,7 +8470,7 @@
             <a:pPr rtl="0"/>
             <a:fld id="{A9AA5441-00F0-4727-A8C3-46A783FC5724}" type="datetime1">
               <a:rPr lang="fr-FR" noProof="0" smtClean="0"/>
-              <a:t>08/04/2022</a:t>
+              <a:t>11/04/2022</a:t>
             </a:fld>
             <a:endParaRPr lang="fr-FR" noProof="0"/>
           </a:p>
@@ -8807,7 +8807,7 @@
             <a:pPr rtl="0"/>
             <a:fld id="{C032274E-A475-49B8-A4A0-80F13BCA3C3A}" type="datetime1">
               <a:rPr lang="fr-FR" noProof="0" smtClean="0"/>
-              <a:t>08/04/2022</a:t>
+              <a:t>11/04/2022</a:t>
             </a:fld>
             <a:endParaRPr lang="fr-FR" noProof="0"/>
           </a:p>
@@ -9156,7 +9156,7 @@
             <a:pPr rtl="0"/>
             <a:fld id="{F9CED46A-8872-470A-807E-03961E183B93}" type="datetime1">
               <a:rPr lang="fr-FR" noProof="0" smtClean="0"/>
-              <a:t>08/04/2022</a:t>
+              <a:t>11/04/2022</a:t>
             </a:fld>
             <a:endParaRPr lang="fr-FR" noProof="0"/>
           </a:p>
@@ -11214,7 +11214,7 @@
             <a:pPr rtl="0"/>
             <a:fld id="{BF2D40E6-123C-44C7-96E6-E5EB17E95AC5}" type="datetime1">
               <a:rPr lang="fr-FR" noProof="0" smtClean="0"/>
-              <a:t>08/04/2022</a:t>
+              <a:t>11/04/2022</a:t>
             </a:fld>
             <a:endParaRPr lang="fr-FR" noProof="0"/>
           </a:p>
@@ -12507,13 +12507,8 @@
           <a:p>
             <a:r>
               <a:rPr lang="fr-FR" dirty="0"/>
-              <a:t>Cas </a:t>
+              <a:t>Cas d’utilisation : Gestion des taches</a:t>
             </a:r>
-            <a:r>
-              <a:rPr lang="fr-FR" dirty="0"/>
-              <a:t>d’utilisation : Gestion des taches</a:t>
-            </a:r>
-            <a:endParaRPr lang="fr-FR" dirty="0"/>
           </a:p>
         </p:txBody>
       </p:sp>
@@ -13154,6 +13149,30 @@
           <a:xfrm>
             <a:off x="6905590" y="1276667"/>
             <a:ext cx="4295775" cy="1400175"/>
+          </a:xfrm>
+          <a:prstGeom prst="rect">
+            <a:avLst/>
+          </a:prstGeom>
+        </p:spPr>
+      </p:pic>
+      <p:pic>
+        <p:nvPicPr>
+          <p:cNvPr id="3" name="Image 2"/>
+          <p:cNvPicPr>
+            <a:picLocks noChangeAspect="1"/>
+          </p:cNvPicPr>
+          <p:nvPr/>
+        </p:nvPicPr>
+        <p:blipFill>
+          <a:blip r:embed="rId4"/>
+          <a:stretch>
+            <a:fillRect/>
+          </a:stretch>
+        </p:blipFill>
+        <p:spPr>
+          <a:xfrm>
+            <a:off x="6905590" y="2820648"/>
+            <a:ext cx="1800225" cy="1552575"/>
           </a:xfrm>
           <a:prstGeom prst="rect">
             <a:avLst/>
@@ -14567,20 +14586,20 @@
 </file>
 
 <file path=customXml/item2.xml><?xml version="1.0" encoding="utf-8"?>
-<p:properties xmlns:p="http://schemas.microsoft.com/office/2006/metadata/properties" xmlns:xsi="http://www.w3.org/2001/XMLSchema-instance" xmlns:pc="http://schemas.microsoft.com/office/infopath/2007/PartnerControls">
-  <documentManagement>
-    <MediaServiceKeyPoints xmlns="71af3243-3dd4-4a8d-8c0d-dd76da1f02a5" xsi:nil="true"/>
-  </documentManagement>
-</p:properties>
-</file>
-
-<file path=customXml/item3.xml><?xml version="1.0" encoding="utf-8"?>
 <?mso-contentType ?>
 <FormTemplates xmlns="http://schemas.microsoft.com/sharepoint/v3/contenttype/forms">
   <Display>DocumentLibraryForm</Display>
   <Edit>DocumentLibraryForm</Edit>
   <New>DocumentLibraryForm</New>
 </FormTemplates>
+</file>
+
+<file path=customXml/item3.xml><?xml version="1.0" encoding="utf-8"?>
+<p:properties xmlns:p="http://schemas.microsoft.com/office/2006/metadata/properties" xmlns:xsi="http://www.w3.org/2001/XMLSchema-instance" xmlns:pc="http://schemas.microsoft.com/office/infopath/2007/PartnerControls">
+  <documentManagement>
+    <MediaServiceKeyPoints xmlns="71af3243-3dd4-4a8d-8c0d-dd76da1f02a5" xsi:nil="true"/>
+  </documentManagement>
+</p:properties>
 </file>
 
 <file path=customXml/itemProps1.xml><?xml version="1.0" encoding="utf-8"?>
@@ -14603,6 +14622,14 @@
 </file>
 
 <file path=customXml/itemProps2.xml><?xml version="1.0" encoding="utf-8"?>
+<ds:datastoreItem xmlns:ds="http://schemas.openxmlformats.org/officeDocument/2006/customXml" ds:itemID="{507C3E52-A0B1-49C0-88BD-66B715EE8BB7}">
+  <ds:schemaRefs>
+    <ds:schemaRef ds:uri="http://schemas.microsoft.com/sharepoint/v3/contenttype/forms"/>
+  </ds:schemaRefs>
+</ds:datastoreItem>
+</file>
+
+<file path=customXml/itemProps3.xml><?xml version="1.0" encoding="utf-8"?>
 <ds:datastoreItem xmlns:ds="http://schemas.openxmlformats.org/officeDocument/2006/customXml" ds:itemID="{CCB8F5F2-61AB-4CE6-A5E3-F34B87B0EE42}">
   <ds:schemaRefs>
     <ds:schemaRef ds:uri="http://schemas.microsoft.com/office/2006/documentManagement/types"/>
@@ -14617,12 +14644,4 @@
     <ds:schemaRef ds:uri="http://purl.org/dc/dcmitype/"/>
   </ds:schemaRefs>
 </ds:datastoreItem>
-</file>
-
-<file path=customXml/itemProps3.xml><?xml version="1.0" encoding="utf-8"?>
-<ds:datastoreItem xmlns:ds="http://schemas.openxmlformats.org/officeDocument/2006/customXml" ds:itemID="{507C3E52-A0B1-49C0-88BD-66B715EE8BB7}">
-  <ds:schemaRefs>
-    <ds:schemaRef ds:uri="http://schemas.microsoft.com/sharepoint/v3/contenttype/forms"/>
-  </ds:schemaRefs>
-</ds:datastoreItem>
 </file>
</xml_diff>